<commit_message>
added 2 questions in html
</commit_message>
<xml_diff>
--- a/html/HTML_Questions.pptx
+++ b/html/HTML_Questions.pptx
@@ -5,7 +5,7 @@
     <p:sldMasterId id="2147483648" r:id="rId1"/>
   </p:sldMasterIdLst>
   <p:notesMasterIdLst>
-    <p:notesMasterId r:id="rId15"/>
+    <p:notesMasterId r:id="rId16"/>
   </p:notesMasterIdLst>
   <p:sldIdLst>
     <p:sldId id="256" r:id="rId2"/>
@@ -20,7 +20,8 @@
     <p:sldId id="347" r:id="rId11"/>
     <p:sldId id="348" r:id="rId12"/>
     <p:sldId id="349" r:id="rId13"/>
-    <p:sldId id="330" r:id="rId14"/>
+    <p:sldId id="350" r:id="rId14"/>
+    <p:sldId id="330" r:id="rId15"/>
   </p:sldIdLst>
   <p:sldSz cx="9144000" cy="6858000" type="screen4x3"/>
   <p:notesSz cx="6858000" cy="9144000"/>
@@ -269,7 +270,7 @@
       </p15:sldGuideLst>
     </p:ext>
     <p:ext uri="http://customooxmlschemas.google.com/">
-      <go:slidesCustomData xmlns="" xmlns:mc="http://schemas.openxmlformats.org/markup-compatibility/2006" xmlns:mv="urn:schemas-microsoft-com:mac:vml" xmlns:c="http://schemas.openxmlformats.org/drawingml/2006/chart" xmlns:dgm="http://schemas.openxmlformats.org/drawingml/2006/diagram" xmlns:o="urn:schemas-microsoft-com:office:office" xmlns:v="urn:schemas-microsoft-com:vml" xmlns:pvml="urn:schemas-microsoft-com:office:powerpoint" xmlns:com="http://schemas.openxmlformats.org/drawingml/2006/compatibility" xmlns:p14="http://schemas.microsoft.com/office/powerpoint/2010/main" xmlns:p15="http://schemas.microsoft.com/office/powerpoint/2012/main" xmlns:ahyp="http://schemas.microsoft.com/office/drawing/2018/hyperlinkcolor" xmlns:go="http://customooxmlschemas.google.com/" r:id="rId89" roundtripDataSignature="AMtx7mgNnX6EGuk1EwPpAoQ9Pa5Tf/GHtA=="/>
+      <go:slidesCustomData xmlns:go="http://customooxmlschemas.google.com/" xmlns:ahyp="http://schemas.microsoft.com/office/drawing/2018/hyperlinkcolor" xmlns:p15="http://schemas.microsoft.com/office/powerpoint/2012/main" xmlns:p14="http://schemas.microsoft.com/office/powerpoint/2010/main" xmlns:com="http://schemas.openxmlformats.org/drawingml/2006/compatibility" xmlns:pvml="urn:schemas-microsoft-com:office:powerpoint" xmlns:v="urn:schemas-microsoft-com:vml" xmlns:o="urn:schemas-microsoft-com:office:office" xmlns:dgm="http://schemas.openxmlformats.org/drawingml/2006/diagram" xmlns:c="http://schemas.openxmlformats.org/drawingml/2006/chart" xmlns:mv="urn:schemas-microsoft-com:mac:vml" xmlns:mc="http://schemas.openxmlformats.org/markup-compatibility/2006" xmlns="" r:id="rId89" roundtripDataSignature="AMtx7mgNnX6EGuk1EwPpAoQ9Pa5Tf/GHtA=="/>
     </p:ext>
   </p:extLst>
 </p:presentation>
@@ -1912,6 +1913,115 @@
 </file>
 
 <file path=ppt/notesSlides/notesSlide13.xml><?xml version="1.0" encoding="utf-8"?>
+<p:notes xmlns:a="http://schemas.openxmlformats.org/drawingml/2006/main" xmlns:r="http://schemas.openxmlformats.org/officeDocument/2006/relationships" xmlns:p="http://schemas.openxmlformats.org/presentationml/2006/main" showMasterSp="0" showMasterPhAnim="0">
+  <p:cSld>
+    <p:spTree>
+      <p:nvGrpSpPr>
+        <p:cNvPr id="1" name="Shape 103"/>
+        <p:cNvGrpSpPr/>
+        <p:nvPr/>
+      </p:nvGrpSpPr>
+      <p:grpSpPr>
+        <a:xfrm>
+          <a:off x="0" y="0"/>
+          <a:ext cx="0" cy="0"/>
+          <a:chOff x="0" y="0"/>
+          <a:chExt cx="0" cy="0"/>
+        </a:xfrm>
+      </p:grpSpPr>
+      <p:sp>
+        <p:nvSpPr>
+          <p:cNvPr id="104" name="Google Shape;104;p3:notes"/>
+          <p:cNvSpPr txBox="1">
+            <a:spLocks noGrp="1"/>
+          </p:cNvSpPr>
+          <p:nvPr>
+            <p:ph type="body" idx="1"/>
+          </p:nvPr>
+        </p:nvSpPr>
+        <p:spPr>
+          <a:xfrm>
+            <a:off x="685800" y="4343400"/>
+            <a:ext cx="5486400" cy="4114800"/>
+          </a:xfrm>
+          <a:prstGeom prst="rect">
+            <a:avLst/>
+          </a:prstGeom>
+        </p:spPr>
+        <p:txBody>
+          <a:bodyPr spcFirstLastPara="1" wrap="square" lIns="91425" tIns="45700" rIns="91425" bIns="45700" anchor="t" anchorCtr="0">
+            <a:noAutofit/>
+          </a:bodyPr>
+          <a:lstStyle/>
+          <a:p>
+            <a:pPr marL="0" lvl="0" indent="0" algn="l" rtl="0">
+              <a:spcBef>
+                <a:spcPts val="0"/>
+              </a:spcBef>
+              <a:spcAft>
+                <a:spcPts val="0"/>
+              </a:spcAft>
+              <a:buNone/>
+            </a:pPr>
+            <a:endParaRPr/>
+          </a:p>
+        </p:txBody>
+      </p:sp>
+      <p:sp>
+        <p:nvSpPr>
+          <p:cNvPr id="105" name="Google Shape;105;p3:notes"/>
+          <p:cNvSpPr>
+            <a:spLocks noGrp="1" noRot="1" noChangeAspect="1"/>
+          </p:cNvSpPr>
+          <p:nvPr>
+            <p:ph type="sldImg" idx="2"/>
+          </p:nvPr>
+        </p:nvSpPr>
+        <p:spPr>
+          <a:xfrm>
+            <a:off x="1143000" y="685800"/>
+            <a:ext cx="4572000" cy="3429000"/>
+          </a:xfrm>
+          <a:custGeom>
+            <a:avLst/>
+            <a:gdLst/>
+            <a:ahLst/>
+            <a:cxnLst/>
+            <a:rect l="l" t="t" r="r" b="b"/>
+            <a:pathLst>
+              <a:path w="120000" h="120000" extrusionOk="0">
+                <a:moveTo>
+                  <a:pt x="0" y="0"/>
+                </a:moveTo>
+                <a:lnTo>
+                  <a:pt x="120000" y="0"/>
+                </a:lnTo>
+                <a:lnTo>
+                  <a:pt x="120000" y="120000"/>
+                </a:lnTo>
+                <a:lnTo>
+                  <a:pt x="0" y="120000"/>
+                </a:lnTo>
+                <a:close/>
+              </a:path>
+            </a:pathLst>
+          </a:custGeom>
+        </p:spPr>
+      </p:sp>
+    </p:spTree>
+    <p:extLst>
+      <p:ext uri="{BB962C8B-B14F-4D97-AF65-F5344CB8AC3E}">
+        <p14:creationId xmlns:p14="http://schemas.microsoft.com/office/powerpoint/2010/main" val="2940887069"/>
+      </p:ext>
+    </p:extLst>
+  </p:cSld>
+  <p:clrMapOvr>
+    <a:masterClrMapping/>
+  </p:clrMapOvr>
+</p:notes>
+</file>
+
+<file path=ppt/notesSlides/notesSlide14.xml><?xml version="1.0" encoding="utf-8"?>
 <p:notes xmlns:a="http://schemas.openxmlformats.org/drawingml/2006/main" xmlns:r="http://schemas.openxmlformats.org/officeDocument/2006/relationships" xmlns:p="http://schemas.openxmlformats.org/presentationml/2006/main" showMasterSp="0" showMasterPhAnim="0">
   <p:cSld>
     <p:spTree>
@@ -13729,8 +13839,8 @@
         </p:nvSpPr>
         <p:spPr>
           <a:xfrm>
-            <a:off x="228600" y="347870"/>
-            <a:ext cx="8382000" cy="5748130"/>
+            <a:off x="228600" y="347869"/>
+            <a:ext cx="8382000" cy="6410739"/>
           </a:xfrm>
           <a:prstGeom prst="rect">
             <a:avLst/>
@@ -13924,6 +14034,50 @@
             </a:r>
           </a:p>
           <a:p>
+            <a:pPr marL="361950" indent="-285750">
+              <a:buFont typeface="Wingdings" panose="05000000000000000000" pitchFamily="2" charset="2"/>
+              <a:buChar char="q"/>
+            </a:pPr>
+            <a:r>
+              <a:rPr lang="en-US" sz="1800" dirty="0"/>
+              <a:t>Data  attribute allows you to add custom data to add  you in your  html tags</a:t>
+            </a:r>
+          </a:p>
+          <a:p>
+            <a:pPr marL="361950" indent="-285750">
+              <a:buFont typeface="Wingdings" panose="05000000000000000000" pitchFamily="2" charset="2"/>
+              <a:buChar char="q"/>
+            </a:pPr>
+            <a:r>
+              <a:rPr lang="en-US" sz="1800" dirty="0"/>
+              <a:t>The attribute name should not contain any uppercase letters, and must be at least one character long after the prefix "data-"</a:t>
+            </a:r>
+          </a:p>
+          <a:p>
+            <a:pPr marL="361950" indent="-285750">
+              <a:buFont typeface="Wingdings" panose="05000000000000000000" pitchFamily="2" charset="2"/>
+              <a:buChar char="q"/>
+            </a:pPr>
+            <a:r>
+              <a:rPr lang="en-US" sz="1800" dirty="0"/>
+              <a:t>The attribute value can be any string</a:t>
+            </a:r>
+          </a:p>
+          <a:p>
+            <a:pPr marL="361950" indent="-285750">
+              <a:buFont typeface="Wingdings" panose="05000000000000000000" pitchFamily="2" charset="2"/>
+              <a:buChar char="q"/>
+            </a:pPr>
+            <a:endParaRPr lang="en-US" sz="1800" dirty="0"/>
+          </a:p>
+          <a:p>
+            <a:pPr marL="361950" indent="-285750">
+              <a:buFont typeface="Wingdings" panose="05000000000000000000" pitchFamily="2" charset="2"/>
+              <a:buChar char="q"/>
+            </a:pPr>
+            <a:endParaRPr lang="en-US" sz="1800" dirty="0"/>
+          </a:p>
+          <a:p>
             <a:pPr marL="76200" indent="0">
               <a:buNone/>
             </a:pPr>
@@ -13997,6 +14151,66 @@
           </a:p>
         </p:txBody>
       </p:sp>
+      <p:pic>
+        <p:nvPicPr>
+          <p:cNvPr id="2" name="Picture 1">
+            <a:extLst>
+              <a:ext uri="{FF2B5EF4-FFF2-40B4-BE49-F238E27FC236}">
+                <a16:creationId xmlns:a16="http://schemas.microsoft.com/office/drawing/2014/main" id="{70C8559A-3FF6-4CB5-BB80-B077E0C5A1DC}"/>
+              </a:ext>
+            </a:extLst>
+          </p:cNvPr>
+          <p:cNvPicPr>
+            <a:picLocks noChangeAspect="1"/>
+          </p:cNvPicPr>
+          <p:nvPr/>
+        </p:nvPicPr>
+        <p:blipFill>
+          <a:blip r:embed="rId3"/>
+          <a:stretch>
+            <a:fillRect/>
+          </a:stretch>
+        </p:blipFill>
+        <p:spPr>
+          <a:xfrm>
+            <a:off x="4805569" y="4899992"/>
+            <a:ext cx="3497196" cy="760964"/>
+          </a:xfrm>
+          <a:prstGeom prst="rect">
+            <a:avLst/>
+          </a:prstGeom>
+        </p:spPr>
+      </p:pic>
+      <p:pic>
+        <p:nvPicPr>
+          <p:cNvPr id="3" name="Picture 2">
+            <a:extLst>
+              <a:ext uri="{FF2B5EF4-FFF2-40B4-BE49-F238E27FC236}">
+                <a16:creationId xmlns:a16="http://schemas.microsoft.com/office/drawing/2014/main" id="{4C751236-8F1A-420C-AFCF-3523DFC17BA8}"/>
+              </a:ext>
+            </a:extLst>
+          </p:cNvPr>
+          <p:cNvPicPr>
+            <a:picLocks noChangeAspect="1"/>
+          </p:cNvPicPr>
+          <p:nvPr/>
+        </p:nvPicPr>
+        <p:blipFill>
+          <a:blip r:embed="rId4"/>
+          <a:stretch>
+            <a:fillRect/>
+          </a:stretch>
+        </p:blipFill>
+        <p:spPr>
+          <a:xfrm>
+            <a:off x="766486" y="5702179"/>
+            <a:ext cx="5490261" cy="760964"/>
+          </a:xfrm>
+          <a:prstGeom prst="rect">
+            <a:avLst/>
+          </a:prstGeom>
+        </p:spPr>
+      </p:pic>
     </p:spTree>
     <p:extLst>
       <p:ext uri="{BB962C8B-B14F-4D97-AF65-F5344CB8AC3E}">
@@ -14246,7 +14460,7 @@
         <p:spPr>
           <a:xfrm>
             <a:off x="228600" y="347870"/>
-            <a:ext cx="8382000" cy="5748130"/>
+            <a:ext cx="8382000" cy="6231834"/>
           </a:xfrm>
           <a:prstGeom prst="rect">
             <a:avLst/>
@@ -14280,17 +14494,51 @@
               <a:buChar char="q"/>
             </a:pPr>
             <a:r>
-              <a:rPr lang="en-US" sz="1800" dirty="0" err="1"/>
-              <a:t>Attr</a:t>
-            </a:r>
-            <a:endParaRPr lang="en-US" sz="3200" dirty="0"/>
+              <a:rPr lang="en-US" sz="1800" dirty="0"/>
+              <a:t>The</a:t>
+            </a:r>
+            <a:r>
+              <a:rPr lang="en-US" sz="1800" b="1" dirty="0"/>
+              <a:t> main reason </a:t>
+            </a:r>
+            <a:r>
+              <a:rPr lang="en-US" sz="1800" dirty="0"/>
+              <a:t>as to why JS files are linked at the bottom of the body is</a:t>
+            </a:r>
+            <a:r>
+              <a:rPr lang="en-US" sz="1800" b="1" dirty="0"/>
+              <a:t> because </a:t>
+            </a:r>
+            <a:r>
+              <a:rPr lang="en-US" sz="1800" dirty="0"/>
+              <a:t>whenever a browser encounters any JS, it parses it and executes that on the spot. Hence if it was to be added at the top, it would make the page rendering slow and thus it would take more time for page load. Moreover since the</a:t>
+            </a:r>
+            <a:r>
+              <a:rPr lang="en-US" sz="1800" b="1" dirty="0"/>
+              <a:t> DOM won't</a:t>
+            </a:r>
+            <a:r>
+              <a:rPr lang="en-US" sz="1800" dirty="0"/>
+              <a:t> be rendered fully, JS won't be able to manipulate the elements.</a:t>
+            </a:r>
           </a:p>
           <a:p>
             <a:pPr>
               <a:buFont typeface="Wingdings" panose="05000000000000000000" pitchFamily="2" charset="2"/>
               <a:buChar char="q"/>
             </a:pPr>
-            <a:endParaRPr lang="en-US" sz="1800" dirty="0"/>
+            <a:r>
+              <a:rPr lang="en-US" sz="1800" dirty="0"/>
+              <a:t>On the contrary, CSS files are linked in the head because they get applied regardless of DOM already rendered or not. Hence the webpage looks elegant as soon as the page loads. However just like JS you can link the CSS at the end which would mean that the webpage first loads with just plain HTML and then the CSS is applied to it. This shift is clearly visible to the user and moreover an important thing to remember is that the page would load with bare minimum HTML and if the user has </a:t>
+            </a:r>
+            <a:r>
+              <a:rPr lang="en-US" sz="1800" b="1" dirty="0"/>
+              <a:t>slow Internet connection,</a:t>
+            </a:r>
+            <a:r>
+              <a:rPr lang="en-US" sz="1800" dirty="0"/>
+              <a:t> the CSS load would take considerable amount of time, which means that the webpage shows just the HTML meanwhile. This might make the user close the website without waiting for it to load fully.</a:t>
+            </a:r>
           </a:p>
           <a:p>
             <a:pPr marL="76200" indent="0">
@@ -14367,6 +14615,191 @@
 </file>
 
 <file path=ppt/slides/slide13.xml><?xml version="1.0" encoding="utf-8"?>
+<p:sld xmlns:a="http://schemas.openxmlformats.org/drawingml/2006/main" xmlns:r="http://schemas.openxmlformats.org/officeDocument/2006/relationships" xmlns:p="http://schemas.openxmlformats.org/presentationml/2006/main">
+  <p:cSld>
+    <p:spTree>
+      <p:nvGrpSpPr>
+        <p:cNvPr id="1" name="Shape 106"/>
+        <p:cNvGrpSpPr/>
+        <p:nvPr/>
+      </p:nvGrpSpPr>
+      <p:grpSpPr>
+        <a:xfrm>
+          <a:off x="0" y="0"/>
+          <a:ext cx="0" cy="0"/>
+          <a:chOff x="0" y="0"/>
+          <a:chExt cx="0" cy="0"/>
+        </a:xfrm>
+      </p:grpSpPr>
+      <p:sp>
+        <p:nvSpPr>
+          <p:cNvPr id="108" name="Google Shape;108;p3"/>
+          <p:cNvSpPr txBox="1">
+            <a:spLocks noGrp="1"/>
+          </p:cNvSpPr>
+          <p:nvPr>
+            <p:ph type="body" idx="1"/>
+          </p:nvPr>
+        </p:nvSpPr>
+        <p:spPr>
+          <a:xfrm>
+            <a:off x="228600" y="347870"/>
+            <a:ext cx="8382000" cy="6231834"/>
+          </a:xfrm>
+          <a:prstGeom prst="rect">
+            <a:avLst/>
+          </a:prstGeom>
+          <a:noFill/>
+          <a:ln>
+            <a:noFill/>
+          </a:ln>
+        </p:spPr>
+        <p:txBody>
+          <a:bodyPr spcFirstLastPara="1" wrap="square" lIns="91425" tIns="45700" rIns="91425" bIns="45700" anchor="t" anchorCtr="0">
+            <a:noAutofit/>
+          </a:bodyPr>
+          <a:lstStyle/>
+          <a:p>
+            <a:pPr marL="0" indent="0">
+              <a:spcBef>
+                <a:spcPts val="280"/>
+              </a:spcBef>
+              <a:buSzPts val="1400"/>
+              <a:buNone/>
+            </a:pPr>
+            <a:r>
+              <a:rPr lang="en-US" dirty="0"/>
+              <a:t>Why is it generally a good idea to position CSS &lt;link&gt;s between &lt;head&gt;&lt;/head&amp;&gt; and JS &lt;script&gt;s just before &lt;/body&gt;? Do you know any exceptions?</a:t>
+            </a:r>
+          </a:p>
+          <a:p>
+            <a:pPr>
+              <a:buFont typeface="Wingdings" panose="05000000000000000000" pitchFamily="2" charset="2"/>
+              <a:buChar char="q"/>
+            </a:pPr>
+            <a:r>
+              <a:rPr lang="en-US" sz="1800" dirty="0"/>
+              <a:t>An exception for positioning of &lt;script&gt;s at the bottom is when your script contains </a:t>
+            </a:r>
+            <a:r>
+              <a:rPr lang="en-US" sz="1800" dirty="0" err="1"/>
+              <a:t>document.write</a:t>
+            </a:r>
+            <a:r>
+              <a:rPr lang="en-US" sz="1800" dirty="0"/>
+              <a:t>(), but these days it's not a good practice to use </a:t>
+            </a:r>
+            <a:r>
+              <a:rPr lang="en-US" sz="1800" dirty="0" err="1"/>
+              <a:t>document.write</a:t>
+            </a:r>
+            <a:r>
+              <a:rPr lang="en-US" sz="1800" dirty="0"/>
+              <a:t>()</a:t>
+            </a:r>
+          </a:p>
+          <a:p>
+            <a:pPr>
+              <a:buFont typeface="Wingdings" panose="05000000000000000000" pitchFamily="2" charset="2"/>
+              <a:buChar char="q"/>
+            </a:pPr>
+            <a:r>
+              <a:rPr lang="en-US" sz="1800" dirty="0"/>
+              <a:t>Also, placing &lt;script&gt;s at the bottom means that the browser cannot start downloading the scripts until the entire document is parsed. </a:t>
+            </a:r>
+          </a:p>
+          <a:p>
+            <a:pPr>
+              <a:buFont typeface="Wingdings" panose="05000000000000000000" pitchFamily="2" charset="2"/>
+              <a:buChar char="q"/>
+            </a:pPr>
+            <a:r>
+              <a:rPr lang="en-US" sz="1800" dirty="0"/>
+              <a:t>One possible workaround is to put &lt;script&gt;in the &lt;head&gt; and use the defer attribute.</a:t>
+            </a:r>
+          </a:p>
+          <a:p>
+            <a:pPr>
+              <a:buFont typeface="Wingdings" panose="05000000000000000000" pitchFamily="2" charset="2"/>
+              <a:buChar char="q"/>
+            </a:pPr>
+            <a:endParaRPr lang="en-US" sz="1800" dirty="0"/>
+          </a:p>
+          <a:p>
+            <a:pPr marL="76200" indent="0">
+              <a:buNone/>
+            </a:pPr>
+            <a:endParaRPr lang="en-US" sz="1800" dirty="0"/>
+          </a:p>
+          <a:p>
+            <a:pPr marL="76200" indent="0" fontAlgn="base">
+              <a:buNone/>
+            </a:pPr>
+            <a:endParaRPr lang="en-US" sz="1800" dirty="0"/>
+          </a:p>
+          <a:p>
+            <a:pPr lvl="1" fontAlgn="base">
+              <a:buFont typeface="Wingdings" panose="05000000000000000000" pitchFamily="2" charset="2"/>
+              <a:buChar char="Ø"/>
+            </a:pPr>
+            <a:endParaRPr lang="en-US" dirty="0"/>
+          </a:p>
+          <a:p>
+            <a:pPr lvl="1" fontAlgn="base">
+              <a:buFont typeface="Wingdings" panose="05000000000000000000" pitchFamily="2" charset="2"/>
+              <a:buChar char="Ø"/>
+            </a:pPr>
+            <a:endParaRPr lang="en-US" dirty="0"/>
+          </a:p>
+          <a:p>
+            <a:pPr lvl="1" fontAlgn="base">
+              <a:buFont typeface="Wingdings" panose="05000000000000000000" pitchFamily="2" charset="2"/>
+              <a:buChar char="Ø"/>
+            </a:pPr>
+            <a:endParaRPr lang="en-US" dirty="0"/>
+          </a:p>
+          <a:p>
+            <a:pPr lvl="1" fontAlgn="base">
+              <a:buFont typeface="Wingdings" panose="05000000000000000000" pitchFamily="2" charset="2"/>
+              <a:buChar char="Ø"/>
+            </a:pPr>
+            <a:endParaRPr lang="en-US" dirty="0"/>
+          </a:p>
+          <a:p>
+            <a:pPr marL="558800" lvl="1" indent="0" fontAlgn="base">
+              <a:buNone/>
+            </a:pPr>
+            <a:endParaRPr lang="en-US" dirty="0"/>
+          </a:p>
+          <a:p>
+            <a:pPr lvl="1" fontAlgn="base">
+              <a:buFont typeface="Wingdings" panose="05000000000000000000" pitchFamily="2" charset="2"/>
+              <a:buChar char="Ø"/>
+            </a:pPr>
+            <a:endParaRPr lang="en-US" sz="1400" dirty="0"/>
+          </a:p>
+          <a:p>
+            <a:pPr marL="558800" lvl="1" indent="0" fontAlgn="base">
+              <a:buNone/>
+            </a:pPr>
+            <a:endParaRPr lang="en-US" sz="1400" dirty="0"/>
+          </a:p>
+        </p:txBody>
+      </p:sp>
+    </p:spTree>
+    <p:extLst>
+      <p:ext uri="{BB962C8B-B14F-4D97-AF65-F5344CB8AC3E}">
+        <p14:creationId xmlns:p14="http://schemas.microsoft.com/office/powerpoint/2010/main" val="1401324048"/>
+      </p:ext>
+    </p:extLst>
+  </p:cSld>
+  <p:clrMapOvr>
+    <a:masterClrMapping/>
+  </p:clrMapOvr>
+</p:sld>
+</file>
+
+<file path=ppt/slides/slide14.xml><?xml version="1.0" encoding="utf-8"?>
 <p:sld xmlns:a="http://schemas.openxmlformats.org/drawingml/2006/main" xmlns:r="http://schemas.openxmlformats.org/officeDocument/2006/relationships" xmlns:p="http://schemas.openxmlformats.org/presentationml/2006/main">
   <p:cSld>
     <p:spTree>

</xml_diff>